<commit_message>
fix config to build
</commit_message>
<xml_diff>
--- a/images/cover.pptx
+++ b/images/cover.pptx
@@ -6,7 +6,8 @@
   </p:sldMasterIdLst>
   <p:sldIdLst>
     <p:sldId id="256" r:id="rId2"/>
-    <p:sldId id="257" r:id="rId3"/>
+    <p:sldId id="258" r:id="rId3"/>
+    <p:sldId id="257" r:id="rId4"/>
   </p:sldIdLst>
   <p:sldSz cx="6858000" cy="9906000" type="A4"/>
   <p:notesSz cx="6858000" cy="9144000"/>
@@ -180,35 +181,35 @@
               <a:buNone/>
               <a:defRPr sz="1800"/>
             </a:lvl1pPr>
-            <a:lvl2pPr marL="342900" indent="0" algn="ctr">
+            <a:lvl2pPr marL="342866" indent="0" algn="ctr">
               <a:buNone/>
               <a:defRPr sz="1500"/>
             </a:lvl2pPr>
-            <a:lvl3pPr marL="685800" indent="0" algn="ctr">
+            <a:lvl3pPr marL="685732" indent="0" algn="ctr">
               <a:buNone/>
               <a:defRPr sz="1350"/>
             </a:lvl3pPr>
-            <a:lvl4pPr marL="1028700" indent="0" algn="ctr">
+            <a:lvl4pPr marL="1028599" indent="0" algn="ctr">
               <a:buNone/>
               <a:defRPr sz="1200"/>
             </a:lvl4pPr>
-            <a:lvl5pPr marL="1371600" indent="0" algn="ctr">
+            <a:lvl5pPr marL="1371464" indent="0" algn="ctr">
               <a:buNone/>
               <a:defRPr sz="1200"/>
             </a:lvl5pPr>
-            <a:lvl6pPr marL="1714500" indent="0" algn="ctr">
+            <a:lvl6pPr marL="1714331" indent="0" algn="ctr">
               <a:buNone/>
               <a:defRPr sz="1200"/>
             </a:lvl6pPr>
-            <a:lvl7pPr marL="2057400" indent="0" algn="ctr">
+            <a:lvl7pPr marL="2057197" indent="0" algn="ctr">
               <a:buNone/>
               <a:defRPr sz="1200"/>
             </a:lvl7pPr>
-            <a:lvl8pPr marL="2400300" indent="0" algn="ctr">
+            <a:lvl8pPr marL="2400063" indent="0" algn="ctr">
               <a:buNone/>
               <a:defRPr sz="1200"/>
             </a:lvl8pPr>
-            <a:lvl9pPr marL="2743200" indent="0" algn="ctr">
+            <a:lvl9pPr marL="2742929" indent="0" algn="ctr">
               <a:buNone/>
               <a:defRPr sz="1200"/>
             </a:lvl9pPr>
@@ -499,7 +500,7 @@
         </p:nvSpPr>
         <p:spPr>
           <a:xfrm>
-            <a:off x="4907757" y="527403"/>
+            <a:off x="4907757" y="527405"/>
             <a:ext cx="1478756" cy="8394877"/>
           </a:xfrm>
         </p:spPr>
@@ -527,7 +528,7 @@
         </p:nvSpPr>
         <p:spPr>
           <a:xfrm>
-            <a:off x="471488" y="527403"/>
+            <a:off x="471488" y="527405"/>
             <a:ext cx="4350544" cy="8394877"/>
           </a:xfrm>
         </p:spPr>
@@ -881,7 +882,7 @@
         </p:nvSpPr>
         <p:spPr>
           <a:xfrm>
-            <a:off x="467916" y="6629226"/>
+            <a:off x="467916" y="6629228"/>
             <a:ext cx="5915025" cy="2166937"/>
           </a:xfrm>
         </p:spPr>
@@ -896,7 +897,7 @@
                 </a:solidFill>
               </a:defRPr>
             </a:lvl1pPr>
-            <a:lvl2pPr marL="342900" indent="0">
+            <a:lvl2pPr marL="342866" indent="0">
               <a:buNone/>
               <a:defRPr sz="1500">
                 <a:solidFill>
@@ -906,7 +907,7 @@
                 </a:solidFill>
               </a:defRPr>
             </a:lvl2pPr>
-            <a:lvl3pPr marL="685800" indent="0">
+            <a:lvl3pPr marL="685732" indent="0">
               <a:buNone/>
               <a:defRPr sz="1350">
                 <a:solidFill>
@@ -916,7 +917,7 @@
                 </a:solidFill>
               </a:defRPr>
             </a:lvl3pPr>
-            <a:lvl4pPr marL="1028700" indent="0">
+            <a:lvl4pPr marL="1028599" indent="0">
               <a:buNone/>
               <a:defRPr sz="1200">
                 <a:solidFill>
@@ -926,7 +927,7 @@
                 </a:solidFill>
               </a:defRPr>
             </a:lvl4pPr>
-            <a:lvl5pPr marL="1371600" indent="0">
+            <a:lvl5pPr marL="1371464" indent="0">
               <a:buNone/>
               <a:defRPr sz="1200">
                 <a:solidFill>
@@ -936,7 +937,7 @@
                 </a:solidFill>
               </a:defRPr>
             </a:lvl5pPr>
-            <a:lvl6pPr marL="1714500" indent="0">
+            <a:lvl6pPr marL="1714331" indent="0">
               <a:buNone/>
               <a:defRPr sz="1200">
                 <a:solidFill>
@@ -946,7 +947,7 @@
                 </a:solidFill>
               </a:defRPr>
             </a:lvl6pPr>
-            <a:lvl7pPr marL="2057400" indent="0">
+            <a:lvl7pPr marL="2057197" indent="0">
               <a:buNone/>
               <a:defRPr sz="1200">
                 <a:solidFill>
@@ -956,7 +957,7 @@
                 </a:solidFill>
               </a:defRPr>
             </a:lvl7pPr>
-            <a:lvl8pPr marL="2400300" indent="0">
+            <a:lvl8pPr marL="2400063" indent="0">
               <a:buNone/>
               <a:defRPr sz="1200">
                 <a:solidFill>
@@ -966,7 +967,7 @@
                 </a:solidFill>
               </a:defRPr>
             </a:lvl8pPr>
-            <a:lvl9pPr marL="2743200" indent="0">
+            <a:lvl9pPr marL="2742929" indent="0">
               <a:buNone/>
               <a:defRPr sz="1200">
                 <a:solidFill>
@@ -1325,7 +1326,7 @@
         </p:nvSpPr>
         <p:spPr>
           <a:xfrm>
-            <a:off x="472381" y="527405"/>
+            <a:off x="472382" y="527405"/>
             <a:ext cx="5915025" cy="1914702"/>
           </a:xfrm>
         </p:spPr>
@@ -1353,7 +1354,7 @@
         </p:nvSpPr>
         <p:spPr>
           <a:xfrm>
-            <a:off x="472381" y="2428347"/>
+            <a:off x="472382" y="2428349"/>
             <a:ext cx="2901255" cy="1190095"/>
           </a:xfrm>
         </p:spPr>
@@ -1364,35 +1365,35 @@
               <a:buNone/>
               <a:defRPr sz="1800" b="1"/>
             </a:lvl1pPr>
-            <a:lvl2pPr marL="342900" indent="0">
+            <a:lvl2pPr marL="342866" indent="0">
               <a:buNone/>
               <a:defRPr sz="1500" b="1"/>
             </a:lvl2pPr>
-            <a:lvl3pPr marL="685800" indent="0">
+            <a:lvl3pPr marL="685732" indent="0">
               <a:buNone/>
               <a:defRPr sz="1350" b="1"/>
             </a:lvl3pPr>
-            <a:lvl4pPr marL="1028700" indent="0">
+            <a:lvl4pPr marL="1028599" indent="0">
               <a:buNone/>
               <a:defRPr sz="1200" b="1"/>
             </a:lvl4pPr>
-            <a:lvl5pPr marL="1371600" indent="0">
+            <a:lvl5pPr marL="1371464" indent="0">
               <a:buNone/>
               <a:defRPr sz="1200" b="1"/>
             </a:lvl5pPr>
-            <a:lvl6pPr marL="1714500" indent="0">
+            <a:lvl6pPr marL="1714331" indent="0">
               <a:buNone/>
               <a:defRPr sz="1200" b="1"/>
             </a:lvl6pPr>
-            <a:lvl7pPr marL="2057400" indent="0">
+            <a:lvl7pPr marL="2057197" indent="0">
               <a:buNone/>
               <a:defRPr sz="1200" b="1"/>
             </a:lvl7pPr>
-            <a:lvl8pPr marL="2400300" indent="0">
+            <a:lvl8pPr marL="2400063" indent="0">
               <a:buNone/>
               <a:defRPr sz="1200" b="1"/>
             </a:lvl8pPr>
-            <a:lvl9pPr marL="2743200" indent="0">
+            <a:lvl9pPr marL="2742929" indent="0">
               <a:buNone/>
               <a:defRPr sz="1200" b="1"/>
             </a:lvl9pPr>
@@ -1418,7 +1419,7 @@
         </p:nvSpPr>
         <p:spPr>
           <a:xfrm>
-            <a:off x="472381" y="3618442"/>
+            <a:off x="472382" y="3618444"/>
             <a:ext cx="2901255" cy="5322183"/>
           </a:xfrm>
         </p:spPr>
@@ -1475,7 +1476,7 @@
         </p:nvSpPr>
         <p:spPr>
           <a:xfrm>
-            <a:off x="3471863" y="2428347"/>
+            <a:off x="3471864" y="2428349"/>
             <a:ext cx="2915543" cy="1190095"/>
           </a:xfrm>
         </p:spPr>
@@ -1486,35 +1487,35 @@
               <a:buNone/>
               <a:defRPr sz="1800" b="1"/>
             </a:lvl1pPr>
-            <a:lvl2pPr marL="342900" indent="0">
+            <a:lvl2pPr marL="342866" indent="0">
               <a:buNone/>
               <a:defRPr sz="1500" b="1"/>
             </a:lvl2pPr>
-            <a:lvl3pPr marL="685800" indent="0">
+            <a:lvl3pPr marL="685732" indent="0">
               <a:buNone/>
               <a:defRPr sz="1350" b="1"/>
             </a:lvl3pPr>
-            <a:lvl4pPr marL="1028700" indent="0">
+            <a:lvl4pPr marL="1028599" indent="0">
               <a:buNone/>
               <a:defRPr sz="1200" b="1"/>
             </a:lvl4pPr>
-            <a:lvl5pPr marL="1371600" indent="0">
+            <a:lvl5pPr marL="1371464" indent="0">
               <a:buNone/>
               <a:defRPr sz="1200" b="1"/>
             </a:lvl5pPr>
-            <a:lvl6pPr marL="1714500" indent="0">
+            <a:lvl6pPr marL="1714331" indent="0">
               <a:buNone/>
               <a:defRPr sz="1200" b="1"/>
             </a:lvl6pPr>
-            <a:lvl7pPr marL="2057400" indent="0">
+            <a:lvl7pPr marL="2057197" indent="0">
               <a:buNone/>
               <a:defRPr sz="1200" b="1"/>
             </a:lvl7pPr>
-            <a:lvl8pPr marL="2400300" indent="0">
+            <a:lvl8pPr marL="2400063" indent="0">
               <a:buNone/>
               <a:defRPr sz="1200" b="1"/>
             </a:lvl8pPr>
-            <a:lvl9pPr marL="2743200" indent="0">
+            <a:lvl9pPr marL="2742929" indent="0">
               <a:buNone/>
               <a:defRPr sz="1200" b="1"/>
             </a:lvl9pPr>
@@ -1540,7 +1541,7 @@
         </p:nvSpPr>
         <p:spPr>
           <a:xfrm>
-            <a:off x="3471863" y="3618442"/>
+            <a:off x="3471864" y="3618444"/>
             <a:ext cx="2915543" cy="5322183"/>
           </a:xfrm>
         </p:spPr>
@@ -1937,7 +1938,7 @@
         </p:nvSpPr>
         <p:spPr>
           <a:xfrm>
-            <a:off x="2915543" y="1426283"/>
+            <a:off x="2915544" y="1426285"/>
             <a:ext cx="3471863" cy="7039681"/>
           </a:xfrm>
         </p:spPr>
@@ -2022,7 +2023,7 @@
         </p:nvSpPr>
         <p:spPr>
           <a:xfrm>
-            <a:off x="472381" y="2971800"/>
+            <a:off x="472381" y="2971802"/>
             <a:ext cx="2211884" cy="5505627"/>
           </a:xfrm>
         </p:spPr>
@@ -2033,35 +2034,35 @@
               <a:buNone/>
               <a:defRPr sz="1200"/>
             </a:lvl1pPr>
-            <a:lvl2pPr marL="342900" indent="0">
+            <a:lvl2pPr marL="342866" indent="0">
               <a:buNone/>
               <a:defRPr sz="1050"/>
             </a:lvl2pPr>
-            <a:lvl3pPr marL="685800" indent="0">
+            <a:lvl3pPr marL="685732" indent="0">
               <a:buNone/>
               <a:defRPr sz="900"/>
             </a:lvl3pPr>
-            <a:lvl4pPr marL="1028700" indent="0">
+            <a:lvl4pPr marL="1028599" indent="0">
               <a:buNone/>
               <a:defRPr sz="750"/>
             </a:lvl4pPr>
-            <a:lvl5pPr marL="1371600" indent="0">
+            <a:lvl5pPr marL="1371464" indent="0">
               <a:buNone/>
               <a:defRPr sz="750"/>
             </a:lvl5pPr>
-            <a:lvl6pPr marL="1714500" indent="0">
+            <a:lvl6pPr marL="1714331" indent="0">
               <a:buNone/>
               <a:defRPr sz="750"/>
             </a:lvl6pPr>
-            <a:lvl7pPr marL="2057400" indent="0">
+            <a:lvl7pPr marL="2057197" indent="0">
               <a:buNone/>
               <a:defRPr sz="750"/>
             </a:lvl7pPr>
-            <a:lvl8pPr marL="2400300" indent="0">
+            <a:lvl8pPr marL="2400063" indent="0">
               <a:buNone/>
               <a:defRPr sz="750"/>
             </a:lvl8pPr>
-            <a:lvl9pPr marL="2743200" indent="0">
+            <a:lvl9pPr marL="2742929" indent="0">
               <a:buNone/>
               <a:defRPr sz="750"/>
             </a:lvl9pPr>
@@ -2214,7 +2215,7 @@
         </p:nvSpPr>
         <p:spPr>
           <a:xfrm>
-            <a:off x="2915543" y="1426283"/>
+            <a:off x="2915544" y="1426285"/>
             <a:ext cx="3471863" cy="7039681"/>
           </a:xfrm>
         </p:spPr>
@@ -2225,35 +2226,35 @@
               <a:buNone/>
               <a:defRPr sz="2400"/>
             </a:lvl1pPr>
-            <a:lvl2pPr marL="342900" indent="0">
+            <a:lvl2pPr marL="342866" indent="0">
               <a:buNone/>
               <a:defRPr sz="2100"/>
             </a:lvl2pPr>
-            <a:lvl3pPr marL="685800" indent="0">
+            <a:lvl3pPr marL="685732" indent="0">
               <a:buNone/>
               <a:defRPr sz="1800"/>
             </a:lvl3pPr>
-            <a:lvl4pPr marL="1028700" indent="0">
+            <a:lvl4pPr marL="1028599" indent="0">
               <a:buNone/>
               <a:defRPr sz="1500"/>
             </a:lvl4pPr>
-            <a:lvl5pPr marL="1371600" indent="0">
+            <a:lvl5pPr marL="1371464" indent="0">
               <a:buNone/>
               <a:defRPr sz="1500"/>
             </a:lvl5pPr>
-            <a:lvl6pPr marL="1714500" indent="0">
+            <a:lvl6pPr marL="1714331" indent="0">
               <a:buNone/>
               <a:defRPr sz="1500"/>
             </a:lvl6pPr>
-            <a:lvl7pPr marL="2057400" indent="0">
+            <a:lvl7pPr marL="2057197" indent="0">
               <a:buNone/>
               <a:defRPr sz="1500"/>
             </a:lvl7pPr>
-            <a:lvl8pPr marL="2400300" indent="0">
+            <a:lvl8pPr marL="2400063" indent="0">
               <a:buNone/>
               <a:defRPr sz="1500"/>
             </a:lvl8pPr>
-            <a:lvl9pPr marL="2743200" indent="0">
+            <a:lvl9pPr marL="2742929" indent="0">
               <a:buNone/>
               <a:defRPr sz="1500"/>
             </a:lvl9pPr>
@@ -2279,7 +2280,7 @@
         </p:nvSpPr>
         <p:spPr>
           <a:xfrm>
-            <a:off x="472381" y="2971800"/>
+            <a:off x="472381" y="2971802"/>
             <a:ext cx="2211884" cy="5505627"/>
           </a:xfrm>
         </p:spPr>
@@ -2290,35 +2291,35 @@
               <a:buNone/>
               <a:defRPr sz="1200"/>
             </a:lvl1pPr>
-            <a:lvl2pPr marL="342900" indent="0">
+            <a:lvl2pPr marL="342866" indent="0">
               <a:buNone/>
               <a:defRPr sz="1050"/>
             </a:lvl2pPr>
-            <a:lvl3pPr marL="685800" indent="0">
+            <a:lvl3pPr marL="685732" indent="0">
               <a:buNone/>
               <a:defRPr sz="900"/>
             </a:lvl3pPr>
-            <a:lvl4pPr marL="1028700" indent="0">
+            <a:lvl4pPr marL="1028599" indent="0">
               <a:buNone/>
               <a:defRPr sz="750"/>
             </a:lvl4pPr>
-            <a:lvl5pPr marL="1371600" indent="0">
+            <a:lvl5pPr marL="1371464" indent="0">
               <a:buNone/>
               <a:defRPr sz="750"/>
             </a:lvl5pPr>
-            <a:lvl6pPr marL="1714500" indent="0">
+            <a:lvl6pPr marL="1714331" indent="0">
               <a:buNone/>
               <a:defRPr sz="750"/>
             </a:lvl6pPr>
-            <a:lvl7pPr marL="2057400" indent="0">
+            <a:lvl7pPr marL="2057197" indent="0">
               <a:buNone/>
               <a:defRPr sz="750"/>
             </a:lvl7pPr>
-            <a:lvl8pPr marL="2400300" indent="0">
+            <a:lvl8pPr marL="2400063" indent="0">
               <a:buNone/>
               <a:defRPr sz="750"/>
             </a:lvl8pPr>
-            <a:lvl9pPr marL="2743200" indent="0">
+            <a:lvl9pPr marL="2742929" indent="0">
               <a:buNone/>
               <a:defRPr sz="750"/>
             </a:lvl9pPr>
@@ -2444,7 +2445,7 @@
         </p:nvSpPr>
         <p:spPr>
           <a:xfrm>
-            <a:off x="471488" y="527405"/>
+            <a:off x="471489" y="527405"/>
             <a:ext cx="5915025" cy="1914702"/>
           </a:xfrm>
           <a:prstGeom prst="rect">
@@ -2477,7 +2478,7 @@
         </p:nvSpPr>
         <p:spPr>
           <a:xfrm>
-            <a:off x="471488" y="2637014"/>
+            <a:off x="471489" y="2637014"/>
             <a:ext cx="5915025" cy="6285266"/>
           </a:xfrm>
           <a:prstGeom prst="rect">
@@ -2539,7 +2540,7 @@
         </p:nvSpPr>
         <p:spPr>
           <a:xfrm>
-            <a:off x="471488" y="9181397"/>
+            <a:off x="471488" y="9181399"/>
             <a:ext cx="1543050" cy="527403"/>
           </a:xfrm>
           <a:prstGeom prst="rect">
@@ -2580,7 +2581,7 @@
         </p:nvSpPr>
         <p:spPr>
           <a:xfrm>
-            <a:off x="2271713" y="9181397"/>
+            <a:off x="2271714" y="9181399"/>
             <a:ext cx="2314575" cy="527403"/>
           </a:xfrm>
           <a:prstGeom prst="rect">
@@ -2617,7 +2618,7 @@
         </p:nvSpPr>
         <p:spPr>
           <a:xfrm>
-            <a:off x="4843463" y="9181397"/>
+            <a:off x="4843463" y="9181399"/>
             <a:ext cx="1543050" cy="527403"/>
           </a:xfrm>
           <a:prstGeom prst="rect">
@@ -2669,7 +2670,7 @@
   </p:sldLayoutIdLst>
   <p:txStyles>
     <p:titleStyle>
-      <a:lvl1pPr algn="l" defTabSz="685800" rtl="0" eaLnBrk="1" latinLnBrk="0" hangingPunct="1">
+      <a:lvl1pPr algn="l" defTabSz="685732" rtl="0" eaLnBrk="1" latinLnBrk="0" hangingPunct="1">
         <a:lnSpc>
           <a:spcPct val="90000"/>
         </a:lnSpc>
@@ -2688,7 +2689,7 @@
       </a:lvl1pPr>
     </p:titleStyle>
     <p:bodyStyle>
-      <a:lvl1pPr marL="171450" indent="-171450" algn="l" defTabSz="685800" rtl="0" eaLnBrk="1" latinLnBrk="0" hangingPunct="1">
+      <a:lvl1pPr marL="171433" indent="-171433" algn="l" defTabSz="685732" rtl="0" eaLnBrk="1" latinLnBrk="0" hangingPunct="1">
         <a:lnSpc>
           <a:spcPct val="90000"/>
         </a:lnSpc>
@@ -2706,7 +2707,7 @@
           <a:cs typeface="+mn-cs"/>
         </a:defRPr>
       </a:lvl1pPr>
-      <a:lvl2pPr marL="514350" indent="-171450" algn="l" defTabSz="685800" rtl="0" eaLnBrk="1" latinLnBrk="0" hangingPunct="1">
+      <a:lvl2pPr marL="514299" indent="-171433" algn="l" defTabSz="685732" rtl="0" eaLnBrk="1" latinLnBrk="0" hangingPunct="1">
         <a:lnSpc>
           <a:spcPct val="90000"/>
         </a:lnSpc>
@@ -2724,7 +2725,7 @@
           <a:cs typeface="+mn-cs"/>
         </a:defRPr>
       </a:lvl2pPr>
-      <a:lvl3pPr marL="857250" indent="-171450" algn="l" defTabSz="685800" rtl="0" eaLnBrk="1" latinLnBrk="0" hangingPunct="1">
+      <a:lvl3pPr marL="857166" indent="-171433" algn="l" defTabSz="685732" rtl="0" eaLnBrk="1" latinLnBrk="0" hangingPunct="1">
         <a:lnSpc>
           <a:spcPct val="90000"/>
         </a:lnSpc>
@@ -2742,7 +2743,7 @@
           <a:cs typeface="+mn-cs"/>
         </a:defRPr>
       </a:lvl3pPr>
-      <a:lvl4pPr marL="1200150" indent="-171450" algn="l" defTabSz="685800" rtl="0" eaLnBrk="1" latinLnBrk="0" hangingPunct="1">
+      <a:lvl4pPr marL="1200032" indent="-171433" algn="l" defTabSz="685732" rtl="0" eaLnBrk="1" latinLnBrk="0" hangingPunct="1">
         <a:lnSpc>
           <a:spcPct val="90000"/>
         </a:lnSpc>
@@ -2760,7 +2761,7 @@
           <a:cs typeface="+mn-cs"/>
         </a:defRPr>
       </a:lvl4pPr>
-      <a:lvl5pPr marL="1543050" indent="-171450" algn="l" defTabSz="685800" rtl="0" eaLnBrk="1" latinLnBrk="0" hangingPunct="1">
+      <a:lvl5pPr marL="1542898" indent="-171433" algn="l" defTabSz="685732" rtl="0" eaLnBrk="1" latinLnBrk="0" hangingPunct="1">
         <a:lnSpc>
           <a:spcPct val="90000"/>
         </a:lnSpc>
@@ -2778,7 +2779,7 @@
           <a:cs typeface="+mn-cs"/>
         </a:defRPr>
       </a:lvl5pPr>
-      <a:lvl6pPr marL="1885950" indent="-171450" algn="l" defTabSz="685800" rtl="0" eaLnBrk="1" latinLnBrk="0" hangingPunct="1">
+      <a:lvl6pPr marL="1885764" indent="-171433" algn="l" defTabSz="685732" rtl="0" eaLnBrk="1" latinLnBrk="0" hangingPunct="1">
         <a:lnSpc>
           <a:spcPct val="90000"/>
         </a:lnSpc>
@@ -2796,7 +2797,7 @@
           <a:cs typeface="+mn-cs"/>
         </a:defRPr>
       </a:lvl6pPr>
-      <a:lvl7pPr marL="2228850" indent="-171450" algn="l" defTabSz="685800" rtl="0" eaLnBrk="1" latinLnBrk="0" hangingPunct="1">
+      <a:lvl7pPr marL="2228630" indent="-171433" algn="l" defTabSz="685732" rtl="0" eaLnBrk="1" latinLnBrk="0" hangingPunct="1">
         <a:lnSpc>
           <a:spcPct val="90000"/>
         </a:lnSpc>
@@ -2814,7 +2815,7 @@
           <a:cs typeface="+mn-cs"/>
         </a:defRPr>
       </a:lvl7pPr>
-      <a:lvl8pPr marL="2571750" indent="-171450" algn="l" defTabSz="685800" rtl="0" eaLnBrk="1" latinLnBrk="0" hangingPunct="1">
+      <a:lvl8pPr marL="2571496" indent="-171433" algn="l" defTabSz="685732" rtl="0" eaLnBrk="1" latinLnBrk="0" hangingPunct="1">
         <a:lnSpc>
           <a:spcPct val="90000"/>
         </a:lnSpc>
@@ -2832,7 +2833,7 @@
           <a:cs typeface="+mn-cs"/>
         </a:defRPr>
       </a:lvl8pPr>
-      <a:lvl9pPr marL="2914650" indent="-171450" algn="l" defTabSz="685800" rtl="0" eaLnBrk="1" latinLnBrk="0" hangingPunct="1">
+      <a:lvl9pPr marL="2914362" indent="-171433" algn="l" defTabSz="685732" rtl="0" eaLnBrk="1" latinLnBrk="0" hangingPunct="1">
         <a:lnSpc>
           <a:spcPct val="90000"/>
         </a:lnSpc>
@@ -2855,7 +2856,7 @@
       <a:defPPr>
         <a:defRPr lang="en-US"/>
       </a:defPPr>
-      <a:lvl1pPr marL="0" algn="l" defTabSz="685800" rtl="0" eaLnBrk="1" latinLnBrk="0" hangingPunct="1">
+      <a:lvl1pPr marL="0" algn="l" defTabSz="685732" rtl="0" eaLnBrk="1" latinLnBrk="0" hangingPunct="1">
         <a:defRPr sz="1350" kern="1200">
           <a:solidFill>
             <a:schemeClr val="tx1"/>
@@ -2865,7 +2866,7 @@
           <a:cs typeface="+mn-cs"/>
         </a:defRPr>
       </a:lvl1pPr>
-      <a:lvl2pPr marL="342900" algn="l" defTabSz="685800" rtl="0" eaLnBrk="1" latinLnBrk="0" hangingPunct="1">
+      <a:lvl2pPr marL="342866" algn="l" defTabSz="685732" rtl="0" eaLnBrk="1" latinLnBrk="0" hangingPunct="1">
         <a:defRPr sz="1350" kern="1200">
           <a:solidFill>
             <a:schemeClr val="tx1"/>
@@ -2875,7 +2876,7 @@
           <a:cs typeface="+mn-cs"/>
         </a:defRPr>
       </a:lvl2pPr>
-      <a:lvl3pPr marL="685800" algn="l" defTabSz="685800" rtl="0" eaLnBrk="1" latinLnBrk="0" hangingPunct="1">
+      <a:lvl3pPr marL="685732" algn="l" defTabSz="685732" rtl="0" eaLnBrk="1" latinLnBrk="0" hangingPunct="1">
         <a:defRPr sz="1350" kern="1200">
           <a:solidFill>
             <a:schemeClr val="tx1"/>
@@ -2885,7 +2886,7 @@
           <a:cs typeface="+mn-cs"/>
         </a:defRPr>
       </a:lvl3pPr>
-      <a:lvl4pPr marL="1028700" algn="l" defTabSz="685800" rtl="0" eaLnBrk="1" latinLnBrk="0" hangingPunct="1">
+      <a:lvl4pPr marL="1028599" algn="l" defTabSz="685732" rtl="0" eaLnBrk="1" latinLnBrk="0" hangingPunct="1">
         <a:defRPr sz="1350" kern="1200">
           <a:solidFill>
             <a:schemeClr val="tx1"/>
@@ -2895,7 +2896,7 @@
           <a:cs typeface="+mn-cs"/>
         </a:defRPr>
       </a:lvl4pPr>
-      <a:lvl5pPr marL="1371600" algn="l" defTabSz="685800" rtl="0" eaLnBrk="1" latinLnBrk="0" hangingPunct="1">
+      <a:lvl5pPr marL="1371464" algn="l" defTabSz="685732" rtl="0" eaLnBrk="1" latinLnBrk="0" hangingPunct="1">
         <a:defRPr sz="1350" kern="1200">
           <a:solidFill>
             <a:schemeClr val="tx1"/>
@@ -2905,7 +2906,7 @@
           <a:cs typeface="+mn-cs"/>
         </a:defRPr>
       </a:lvl5pPr>
-      <a:lvl6pPr marL="1714500" algn="l" defTabSz="685800" rtl="0" eaLnBrk="1" latinLnBrk="0" hangingPunct="1">
+      <a:lvl6pPr marL="1714331" algn="l" defTabSz="685732" rtl="0" eaLnBrk="1" latinLnBrk="0" hangingPunct="1">
         <a:defRPr sz="1350" kern="1200">
           <a:solidFill>
             <a:schemeClr val="tx1"/>
@@ -2915,7 +2916,7 @@
           <a:cs typeface="+mn-cs"/>
         </a:defRPr>
       </a:lvl6pPr>
-      <a:lvl7pPr marL="2057400" algn="l" defTabSz="685800" rtl="0" eaLnBrk="1" latinLnBrk="0" hangingPunct="1">
+      <a:lvl7pPr marL="2057197" algn="l" defTabSz="685732" rtl="0" eaLnBrk="1" latinLnBrk="0" hangingPunct="1">
         <a:defRPr sz="1350" kern="1200">
           <a:solidFill>
             <a:schemeClr val="tx1"/>
@@ -2925,7 +2926,7 @@
           <a:cs typeface="+mn-cs"/>
         </a:defRPr>
       </a:lvl7pPr>
-      <a:lvl8pPr marL="2400300" algn="l" defTabSz="685800" rtl="0" eaLnBrk="1" latinLnBrk="0" hangingPunct="1">
+      <a:lvl8pPr marL="2400063" algn="l" defTabSz="685732" rtl="0" eaLnBrk="1" latinLnBrk="0" hangingPunct="1">
         <a:defRPr sz="1350" kern="1200">
           <a:solidFill>
             <a:schemeClr val="tx1"/>
@@ -2935,7 +2936,7 @@
           <a:cs typeface="+mn-cs"/>
         </a:defRPr>
       </a:lvl8pPr>
-      <a:lvl9pPr marL="2743200" algn="l" defTabSz="685800" rtl="0" eaLnBrk="1" latinLnBrk="0" hangingPunct="1">
+      <a:lvl9pPr marL="2742929" algn="l" defTabSz="685732" rtl="0" eaLnBrk="1" latinLnBrk="0" hangingPunct="1">
         <a:defRPr sz="1350" kern="1200">
           <a:solidFill>
             <a:schemeClr val="tx1"/>
@@ -2996,7 +2997,7 @@
           <a:lstStyle/>
           <a:p>
             <a:r>
-              <a:rPr lang="en-US" sz="13800" b="1" dirty="0">
+              <a:rPr lang="en-US" sz="13799" b="1" dirty="0">
                 <a:gradFill>
                   <a:gsLst>
                     <a:gs pos="50000">
@@ -3018,7 +3019,7 @@
               <a:t>Cognito</a:t>
             </a:r>
             <a:br>
-              <a:rPr lang="en-US" sz="13800" b="1" dirty="0">
+              <a:rPr lang="en-US" sz="13799" b="1" dirty="0">
                 <a:gradFill>
                   <a:gsLst>
                     <a:gs pos="50000">
@@ -3039,7 +3040,7 @@
               </a:rPr>
             </a:br>
             <a:r>
-              <a:rPr lang="en-US" sz="5400" b="1" dirty="0" err="1">
+              <a:rPr lang="en-US" sz="5399" b="1" dirty="0" err="1">
                 <a:gradFill>
                   <a:gsLst>
                     <a:gs pos="50000">
@@ -3060,7 +3061,7 @@
               </a:rPr>
               <a:t>UserPool</a:t>
             </a:r>
-            <a:endParaRPr lang="en-US" sz="5400" b="1" dirty="0">
+            <a:endParaRPr lang="en-US" sz="5399" b="1" dirty="0">
               <a:gradFill>
                 <a:gsLst>
                   <a:gs pos="50000">
@@ -3119,7 +3120,7 @@
           </a:gradFill>
         </p:spPr>
         <p:txBody>
-          <a:bodyPr tIns="180000" bIns="46800">
+          <a:bodyPr vert="horz" lIns="35610" tIns="180000" rIns="35610" bIns="46800" rtlCol="0">
             <a:normAutofit/>
           </a:bodyPr>
           <a:lstStyle/>
@@ -3217,8 +3218,8 @@
         </p:nvSpPr>
         <p:spPr>
           <a:xfrm>
-            <a:off x="1197142" y="3248526"/>
-            <a:ext cx="4463715" cy="1107996"/>
+            <a:off x="514351" y="3248527"/>
+            <a:ext cx="5829300" cy="923330"/>
           </a:xfrm>
           <a:prstGeom prst="rect">
             <a:avLst/>
@@ -3233,13 +3234,13 @@
           <a:p>
             <a:pPr algn="ctr"/>
             <a:r>
-              <a:rPr lang="ja-JP" altLang="en-US" sz="6600" b="1">
+              <a:rPr lang="ja-JP" altLang="en-US" sz="5400" b="1">
                 <a:latin typeface="Meiryo UI" panose="020B0604030504040204" pitchFamily="34" charset="-128"/>
                 <a:ea typeface="Meiryo UI" panose="020B0604030504040204" pitchFamily="34" charset="-128"/>
               </a:rPr>
               <a:t>実践入門</a:t>
             </a:r>
-            <a:endParaRPr lang="en-US" sz="6600" b="1" dirty="0">
+            <a:endParaRPr lang="en-US" sz="5400" b="1" dirty="0">
               <a:latin typeface="Meiryo UI" panose="020B0604030504040204" pitchFamily="34" charset="-128"/>
               <a:ea typeface="Meiryo UI" panose="020B0604030504040204" pitchFamily="34" charset="-128"/>
             </a:endParaRPr>
@@ -3260,7 +3261,7 @@
         </p:nvSpPr>
         <p:spPr>
           <a:xfrm>
-            <a:off x="1197141" y="4454934"/>
+            <a:off x="1197142" y="4454934"/>
             <a:ext cx="4463715" cy="584775"/>
           </a:xfrm>
           <a:prstGeom prst="rect">
@@ -3276,18 +3277,11 @@
           <a:p>
             <a:pPr algn="ctr"/>
             <a:r>
-              <a:rPr lang="ja-JP" altLang="en-US" sz="1600">
-                <a:latin typeface="Meiryo UI" panose="020B0604030504040204" pitchFamily="34" charset="-128"/>
-                <a:ea typeface="Meiryo UI" panose="020B0604030504040204" pitchFamily="34" charset="-128"/>
-              </a:rPr>
-              <a:t>さわら</a:t>
-            </a:r>
-            <a:r>
               <a:rPr lang="en-US" altLang="ja-JP" sz="1600" dirty="0">
                 <a:latin typeface="Meiryo UI" panose="020B0604030504040204" pitchFamily="34" charset="-128"/>
                 <a:ea typeface="Meiryo UI" panose="020B0604030504040204" pitchFamily="34" charset="-128"/>
               </a:rPr>
-              <a:t>(@</a:t>
+              <a:t>Hiroaki Ogasawara(@</a:t>
             </a:r>
             <a:r>
               <a:rPr lang="en-US" altLang="ja-JP" sz="1600" dirty="0" err="1">
@@ -3782,6 +3776,75 @@
           </a:p>
         </p:txBody>
       </p:sp>
+      <p:sp>
+        <p:nvSpPr>
+          <p:cNvPr id="15" name="TextBox 14">
+            <a:extLst>
+              <a:ext uri="{FF2B5EF4-FFF2-40B4-BE49-F238E27FC236}">
+                <a16:creationId xmlns:a16="http://schemas.microsoft.com/office/drawing/2014/main" id="{7A7BA7BA-FD4E-0B4F-BCB4-A9114F33DA1D}"/>
+              </a:ext>
+            </a:extLst>
+          </p:cNvPr>
+          <p:cNvSpPr txBox="1"/>
+          <p:nvPr/>
+        </p:nvSpPr>
+        <p:spPr>
+          <a:xfrm rot="20700000">
+            <a:off x="-1152360" y="2960358"/>
+            <a:ext cx="4463715" cy="707886"/>
+          </a:xfrm>
+          <a:prstGeom prst="rect">
+            <a:avLst/>
+          </a:prstGeom>
+          <a:noFill/>
+        </p:spPr>
+        <p:txBody>
+          <a:bodyPr wrap="square" rtlCol="0">
+            <a:spAutoFit/>
+          </a:bodyPr>
+          <a:lstStyle/>
+          <a:p>
+            <a:pPr algn="ctr"/>
+            <a:r>
+              <a:rPr lang="en-US" altLang="ja-JP" sz="4000" b="1" dirty="0">
+                <a:solidFill>
+                  <a:srgbClr val="DE2A34"/>
+                </a:solidFill>
+                <a:latin typeface="Meiryo UI" panose="020B0604030504040204" pitchFamily="34" charset="-128"/>
+                <a:ea typeface="Meiryo UI" panose="020B0604030504040204" pitchFamily="34" charset="-128"/>
+              </a:rPr>
+              <a:t>[</a:t>
+            </a:r>
+            <a:r>
+              <a:rPr lang="ja-JP" altLang="en-US" sz="4000" b="1">
+                <a:solidFill>
+                  <a:srgbClr val="DE2A34"/>
+                </a:solidFill>
+                <a:latin typeface="Meiryo UI" panose="020B0604030504040204" pitchFamily="34" charset="-128"/>
+                <a:ea typeface="Meiryo UI" panose="020B0604030504040204" pitchFamily="34" charset="-128"/>
+              </a:rPr>
+              <a:t>体験版</a:t>
+            </a:r>
+            <a:r>
+              <a:rPr lang="en-US" altLang="ja-JP" sz="4000" b="1" dirty="0">
+                <a:solidFill>
+                  <a:srgbClr val="DE2A34"/>
+                </a:solidFill>
+                <a:latin typeface="Meiryo UI" panose="020B0604030504040204" pitchFamily="34" charset="-128"/>
+                <a:ea typeface="Meiryo UI" panose="020B0604030504040204" pitchFamily="34" charset="-128"/>
+              </a:rPr>
+              <a:t>]</a:t>
+            </a:r>
+            <a:endParaRPr lang="en-US" sz="4000" b="1" dirty="0">
+              <a:solidFill>
+                <a:srgbClr val="DE2A34"/>
+              </a:solidFill>
+              <a:latin typeface="Meiryo UI" panose="020B0604030504040204" pitchFamily="34" charset="-128"/>
+              <a:ea typeface="Meiryo UI" panose="020B0604030504040204" pitchFamily="34" charset="-128"/>
+            </a:endParaRPr>
+          </a:p>
+        </p:txBody>
+      </p:sp>
     </p:spTree>
     <p:extLst>
       <p:ext uri="{BB962C8B-B14F-4D97-AF65-F5344CB8AC3E}">
@@ -3796,6 +3859,535 @@
 </file>
 
 <file path=ppt/slides/slide2.xml><?xml version="1.0" encoding="utf-8"?>
+<p:sld xmlns:a="http://schemas.openxmlformats.org/drawingml/2006/main" xmlns:r="http://schemas.openxmlformats.org/officeDocument/2006/relationships" xmlns:p="http://schemas.openxmlformats.org/presentationml/2006/main">
+  <p:cSld>
+    <p:spTree>
+      <p:nvGrpSpPr>
+        <p:cNvPr id="1" name=""/>
+        <p:cNvGrpSpPr/>
+        <p:nvPr/>
+      </p:nvGrpSpPr>
+      <p:grpSpPr>
+        <a:xfrm>
+          <a:off x="0" y="0"/>
+          <a:ext cx="0" cy="0"/>
+          <a:chOff x="0" y="0"/>
+          <a:chExt cx="0" cy="0"/>
+        </a:xfrm>
+      </p:grpSpPr>
+      <p:pic>
+        <p:nvPicPr>
+          <p:cNvPr id="17" name="Picture 16">
+            <a:extLst>
+              <a:ext uri="{FF2B5EF4-FFF2-40B4-BE49-F238E27FC236}">
+                <a16:creationId xmlns:a16="http://schemas.microsoft.com/office/drawing/2014/main" id="{5F0E76FD-0A90-7947-98AA-B70EEE2A7BA6}"/>
+              </a:ext>
+            </a:extLst>
+          </p:cNvPr>
+          <p:cNvPicPr>
+            <a:picLocks noChangeAspect="1"/>
+          </p:cNvPicPr>
+          <p:nvPr/>
+        </p:nvPicPr>
+        <p:blipFill>
+          <a:blip r:embed="rId2"/>
+          <a:stretch>
+            <a:fillRect/>
+          </a:stretch>
+        </p:blipFill>
+        <p:spPr>
+          <a:xfrm>
+            <a:off x="0" y="0"/>
+            <a:ext cx="6858000" cy="9906000"/>
+          </a:xfrm>
+          <a:prstGeom prst="rect">
+            <a:avLst/>
+          </a:prstGeom>
+        </p:spPr>
+      </p:pic>
+      <p:sp>
+        <p:nvSpPr>
+          <p:cNvPr id="18" name="Title 1">
+            <a:extLst>
+              <a:ext uri="{FF2B5EF4-FFF2-40B4-BE49-F238E27FC236}">
+                <a16:creationId xmlns:a16="http://schemas.microsoft.com/office/drawing/2014/main" id="{D38A9A6D-127D-6E4D-9E4A-457E6E5C1419}"/>
+              </a:ext>
+            </a:extLst>
+          </p:cNvPr>
+          <p:cNvSpPr>
+            <a:spLocks noGrp="1"/>
+          </p:cNvSpPr>
+          <p:nvPr>
+            <p:ph type="ctrTitle"/>
+          </p:nvPr>
+        </p:nvSpPr>
+        <p:spPr>
+          <a:xfrm>
+            <a:off x="514350" y="3250713"/>
+            <a:ext cx="5829300" cy="2740140"/>
+          </a:xfrm>
+        </p:spPr>
+        <p:txBody>
+          <a:bodyPr anchor="t">
+            <a:normAutofit/>
+          </a:bodyPr>
+          <a:lstStyle/>
+          <a:p>
+            <a:r>
+              <a:rPr lang="en-US" sz="13799" b="1" dirty="0">
+                <a:gradFill>
+                  <a:gsLst>
+                    <a:gs pos="50000">
+                      <a:srgbClr val="754169"/>
+                    </a:gs>
+                    <a:gs pos="0">
+                      <a:srgbClr val="4A2544"/>
+                    </a:gs>
+                    <a:gs pos="100000">
+                      <a:srgbClr val="BA799D"/>
+                    </a:gs>
+                  </a:gsLst>
+                  <a:lin ang="0" scaled="1"/>
+                </a:gradFill>
+                <a:latin typeface="Impact" panose="020B0806030902050204" pitchFamily="34" charset="0"/>
+                <a:ea typeface="Toppan Bunkyu Midashi Gothic Ex" panose="020B0900000000000000" pitchFamily="34" charset="-128"/>
+                <a:cs typeface="Diwan Kufi" pitchFamily="2" charset="-78"/>
+              </a:rPr>
+              <a:t>Cognito</a:t>
+            </a:r>
+            <a:br>
+              <a:rPr lang="en-US" sz="13799" b="1" dirty="0">
+                <a:gradFill>
+                  <a:gsLst>
+                    <a:gs pos="50000">
+                      <a:srgbClr val="754169"/>
+                    </a:gs>
+                    <a:gs pos="0">
+                      <a:srgbClr val="4A2544"/>
+                    </a:gs>
+                    <a:gs pos="100000">
+                      <a:srgbClr val="BA799D"/>
+                    </a:gs>
+                  </a:gsLst>
+                  <a:lin ang="0" scaled="1"/>
+                </a:gradFill>
+                <a:latin typeface="Impact" panose="020B0806030902050204" pitchFamily="34" charset="0"/>
+                <a:ea typeface="Toppan Bunkyu Midashi Gothic Ex" panose="020B0900000000000000" pitchFamily="34" charset="-128"/>
+                <a:cs typeface="Diwan Kufi" pitchFamily="2" charset="-78"/>
+              </a:rPr>
+            </a:br>
+            <a:r>
+              <a:rPr lang="en-US" sz="5399" b="1" dirty="0" err="1">
+                <a:gradFill>
+                  <a:gsLst>
+                    <a:gs pos="50000">
+                      <a:srgbClr val="754169"/>
+                    </a:gs>
+                    <a:gs pos="0">
+                      <a:srgbClr val="4A2544"/>
+                    </a:gs>
+                    <a:gs pos="100000">
+                      <a:srgbClr val="BA799D"/>
+                    </a:gs>
+                  </a:gsLst>
+                  <a:lin ang="0" scaled="1"/>
+                </a:gradFill>
+                <a:latin typeface="Impact" panose="020B0806030902050204" pitchFamily="34" charset="0"/>
+                <a:ea typeface="Toppan Bunkyu Midashi Gothic Ex" panose="020B0900000000000000" pitchFamily="34" charset="-128"/>
+                <a:cs typeface="Diwan Kufi" pitchFamily="2" charset="-78"/>
+              </a:rPr>
+              <a:t>UserPool</a:t>
+            </a:r>
+            <a:endParaRPr lang="en-US" sz="5399" b="1" dirty="0">
+              <a:gradFill>
+                <a:gsLst>
+                  <a:gs pos="50000">
+                    <a:srgbClr val="754169"/>
+                  </a:gs>
+                  <a:gs pos="0">
+                    <a:srgbClr val="4A2544"/>
+                  </a:gs>
+                  <a:gs pos="100000">
+                    <a:srgbClr val="BA799D"/>
+                  </a:gs>
+                </a:gsLst>
+                <a:lin ang="0" scaled="1"/>
+              </a:gradFill>
+              <a:latin typeface="Impact" panose="020B0806030902050204" pitchFamily="34" charset="0"/>
+              <a:ea typeface="Toppan Bunkyu Midashi Gothic Ex" panose="020B0900000000000000" pitchFamily="34" charset="-128"/>
+              <a:cs typeface="Diwan Kufi" pitchFamily="2" charset="-78"/>
+            </a:endParaRPr>
+          </a:p>
+        </p:txBody>
+      </p:sp>
+      <p:sp>
+        <p:nvSpPr>
+          <p:cNvPr id="19" name="TextBox 18">
+            <a:extLst>
+              <a:ext uri="{FF2B5EF4-FFF2-40B4-BE49-F238E27FC236}">
+                <a16:creationId xmlns:a16="http://schemas.microsoft.com/office/drawing/2014/main" id="{A99B27FF-DAAD-7A45-85D3-4BB6052C7A11}"/>
+              </a:ext>
+            </a:extLst>
+          </p:cNvPr>
+          <p:cNvSpPr txBox="1"/>
+          <p:nvPr/>
+        </p:nvSpPr>
+        <p:spPr>
+          <a:xfrm>
+            <a:off x="514350" y="5990853"/>
+            <a:ext cx="5829300" cy="1107996"/>
+          </a:xfrm>
+          <a:prstGeom prst="rect">
+            <a:avLst/>
+          </a:prstGeom>
+          <a:noFill/>
+        </p:spPr>
+        <p:txBody>
+          <a:bodyPr wrap="square" rtlCol="0">
+            <a:spAutoFit/>
+          </a:bodyPr>
+          <a:lstStyle/>
+          <a:p>
+            <a:pPr algn="ctr"/>
+            <a:r>
+              <a:rPr lang="ja-JP" altLang="en-US" sz="6600" b="1">
+                <a:latin typeface="Meiryo UI" panose="020B0604030504040204" pitchFamily="34" charset="-128"/>
+                <a:ea typeface="Meiryo UI" panose="020B0604030504040204" pitchFamily="34" charset="-128"/>
+              </a:rPr>
+              <a:t>実践入門</a:t>
+            </a:r>
+            <a:endParaRPr lang="en-US" sz="6600" b="1" dirty="0">
+              <a:latin typeface="Meiryo UI" panose="020B0604030504040204" pitchFamily="34" charset="-128"/>
+              <a:ea typeface="Meiryo UI" panose="020B0604030504040204" pitchFamily="34" charset="-128"/>
+            </a:endParaRPr>
+          </a:p>
+        </p:txBody>
+      </p:sp>
+      <p:sp>
+        <p:nvSpPr>
+          <p:cNvPr id="20" name="Subtitle 2">
+            <a:extLst>
+              <a:ext uri="{FF2B5EF4-FFF2-40B4-BE49-F238E27FC236}">
+                <a16:creationId xmlns:a16="http://schemas.microsoft.com/office/drawing/2014/main" id="{63C97462-E944-C147-8D39-13C268A1BD8D}"/>
+              </a:ext>
+            </a:extLst>
+          </p:cNvPr>
+          <p:cNvSpPr>
+            <a:spLocks noGrp="1"/>
+          </p:cNvSpPr>
+          <p:nvPr>
+            <p:ph type="subTitle" idx="1"/>
+          </p:nvPr>
+        </p:nvSpPr>
+        <p:spPr>
+          <a:xfrm>
+            <a:off x="234176" y="8129774"/>
+            <a:ext cx="6389648" cy="1547183"/>
+          </a:xfrm>
+          <a:gradFill>
+            <a:gsLst>
+              <a:gs pos="50000">
+                <a:srgbClr val="754169"/>
+              </a:gs>
+              <a:gs pos="0">
+                <a:srgbClr val="4A2544"/>
+              </a:gs>
+              <a:gs pos="100000">
+                <a:srgbClr val="BA799D"/>
+              </a:gs>
+            </a:gsLst>
+            <a:lin ang="0" scaled="1"/>
+          </a:gradFill>
+        </p:spPr>
+        <p:txBody>
+          <a:bodyPr vert="horz" lIns="35610" tIns="180000" rIns="35610" bIns="46800" rtlCol="0">
+            <a:normAutofit/>
+          </a:bodyPr>
+          <a:lstStyle/>
+          <a:p>
+            <a:r>
+              <a:rPr lang="en-US" sz="3600" b="1" dirty="0">
+                <a:solidFill>
+                  <a:schemeClr val="bg1"/>
+                </a:solidFill>
+                <a:latin typeface="Meiryo UI" panose="020B0604030504040204" pitchFamily="34" charset="-128"/>
+                <a:ea typeface="Meiryo UI" panose="020B0604030504040204" pitchFamily="34" charset="-128"/>
+              </a:rPr>
+              <a:t>Amazon Cognito</a:t>
+            </a:r>
+            <a:r>
+              <a:rPr lang="ja-JP" altLang="en-US" sz="3600" b="1">
+                <a:solidFill>
+                  <a:schemeClr val="bg1"/>
+                </a:solidFill>
+                <a:latin typeface="Meiryo UI" panose="020B0604030504040204" pitchFamily="34" charset="-128"/>
+                <a:ea typeface="Meiryo UI" panose="020B0604030504040204" pitchFamily="34" charset="-128"/>
+              </a:rPr>
+              <a:t>の基本から</a:t>
+            </a:r>
+            <a:endParaRPr lang="en-US" altLang="ja-JP" sz="3600" b="1" dirty="0">
+              <a:solidFill>
+                <a:schemeClr val="bg1"/>
+              </a:solidFill>
+              <a:latin typeface="Meiryo UI" panose="020B0604030504040204" pitchFamily="34" charset="-128"/>
+              <a:ea typeface="Meiryo UI" panose="020B0604030504040204" pitchFamily="34" charset="-128"/>
+            </a:endParaRPr>
+          </a:p>
+          <a:p>
+            <a:r>
+              <a:rPr lang="ja-JP" altLang="en-US" sz="3600" b="1">
+                <a:solidFill>
+                  <a:schemeClr val="bg1"/>
+                </a:solidFill>
+                <a:latin typeface="Meiryo UI" panose="020B0604030504040204" pitchFamily="34" charset="-128"/>
+                <a:ea typeface="Meiryo UI" panose="020B0604030504040204" pitchFamily="34" charset="-128"/>
+              </a:rPr>
+              <a:t>ユーザー移行の実装まで</a:t>
+            </a:r>
+            <a:endParaRPr lang="en-US" sz="3600" b="1" dirty="0">
+              <a:solidFill>
+                <a:schemeClr val="bg1"/>
+              </a:solidFill>
+              <a:latin typeface="Meiryo UI" panose="020B0604030504040204" pitchFamily="34" charset="-128"/>
+              <a:ea typeface="Meiryo UI" panose="020B0604030504040204" pitchFamily="34" charset="-128"/>
+            </a:endParaRPr>
+          </a:p>
+        </p:txBody>
+      </p:sp>
+      <p:sp>
+        <p:nvSpPr>
+          <p:cNvPr id="21" name="Rectangle 20">
+            <a:extLst>
+              <a:ext uri="{FF2B5EF4-FFF2-40B4-BE49-F238E27FC236}">
+                <a16:creationId xmlns:a16="http://schemas.microsoft.com/office/drawing/2014/main" id="{9E3E1A34-23C1-FC4F-A494-692CF2B78AA5}"/>
+              </a:ext>
+            </a:extLst>
+          </p:cNvPr>
+          <p:cNvSpPr/>
+          <p:nvPr/>
+        </p:nvSpPr>
+        <p:spPr>
+          <a:xfrm>
+            <a:off x="2000983" y="229043"/>
+            <a:ext cx="4652149" cy="1477328"/>
+          </a:xfrm>
+          <a:prstGeom prst="rect">
+            <a:avLst/>
+          </a:prstGeom>
+        </p:spPr>
+        <p:txBody>
+          <a:bodyPr wrap="square">
+            <a:spAutoFit/>
+          </a:bodyPr>
+          <a:lstStyle/>
+          <a:p>
+            <a:r>
+              <a:rPr lang="en-US" sz="6600" b="1" dirty="0">
+                <a:gradFill>
+                  <a:gsLst>
+                    <a:gs pos="50000">
+                      <a:srgbClr val="754169"/>
+                    </a:gs>
+                    <a:gs pos="0">
+                      <a:srgbClr val="4A2544"/>
+                    </a:gs>
+                    <a:gs pos="100000">
+                      <a:srgbClr val="BA799D"/>
+                    </a:gs>
+                  </a:gsLst>
+                  <a:lin ang="0" scaled="1"/>
+                </a:gradFill>
+                <a:latin typeface="Impact" panose="020B0806030902050204" pitchFamily="34" charset="0"/>
+                <a:ea typeface="Toppan Bunkyu Midashi Gothic Ex" panose="020B0900000000000000" pitchFamily="34" charset="-128"/>
+                <a:cs typeface="Diwan Kufi" pitchFamily="2" charset="-78"/>
+              </a:rPr>
+              <a:t>Cognito</a:t>
+            </a:r>
+            <a:r>
+              <a:rPr lang="ja-JP" altLang="en-US" sz="6600" b="1">
+                <a:gradFill>
+                  <a:gsLst>
+                    <a:gs pos="50000">
+                      <a:srgbClr val="754169"/>
+                    </a:gs>
+                    <a:gs pos="0">
+                      <a:srgbClr val="4A2544"/>
+                    </a:gs>
+                    <a:gs pos="100000">
+                      <a:srgbClr val="BA799D"/>
+                    </a:gs>
+                  </a:gsLst>
+                  <a:lin ang="0" scaled="1"/>
+                </a:gradFill>
+                <a:latin typeface="Impact" panose="020B0806030902050204" pitchFamily="34" charset="0"/>
+                <a:ea typeface="Toppan Bunkyu Midashi Gothic Ex" panose="020B0900000000000000" pitchFamily="34" charset="-128"/>
+                <a:cs typeface="Diwan Kufi" pitchFamily="2" charset="-78"/>
+              </a:rPr>
+              <a:t>屋</a:t>
+            </a:r>
+            <a:endParaRPr lang="en-US" altLang="ja-JP" sz="6600" b="1" dirty="0">
+              <a:gradFill>
+                <a:gsLst>
+                  <a:gs pos="50000">
+                    <a:srgbClr val="754169"/>
+                  </a:gs>
+                  <a:gs pos="0">
+                    <a:srgbClr val="4A2544"/>
+                  </a:gs>
+                  <a:gs pos="100000">
+                    <a:srgbClr val="BA799D"/>
+                  </a:gs>
+                </a:gsLst>
+                <a:lin ang="0" scaled="1"/>
+              </a:gradFill>
+              <a:latin typeface="Impact" panose="020B0806030902050204" pitchFamily="34" charset="0"/>
+              <a:ea typeface="Toppan Bunkyu Midashi Gothic Ex" panose="020B0900000000000000" pitchFamily="34" charset="-128"/>
+              <a:cs typeface="Diwan Kufi" pitchFamily="2" charset="-78"/>
+            </a:endParaRPr>
+          </a:p>
+          <a:p>
+            <a:r>
+              <a:rPr lang="en-US" altLang="ja-JP" sz="2400" b="1" dirty="0">
+                <a:gradFill>
+                  <a:gsLst>
+                    <a:gs pos="50000">
+                      <a:srgbClr val="754169"/>
+                    </a:gs>
+                    <a:gs pos="0">
+                      <a:srgbClr val="4A2544"/>
+                    </a:gs>
+                    <a:gs pos="100000">
+                      <a:srgbClr val="BA799D"/>
+                    </a:gs>
+                  </a:gsLst>
+                  <a:lin ang="0" scaled="1"/>
+                </a:gradFill>
+                <a:latin typeface="Meiryo UI" panose="020B0604030504040204" pitchFamily="34" charset="-128"/>
+                <a:ea typeface="Meiryo UI" panose="020B0604030504040204" pitchFamily="34" charset="-128"/>
+                <a:cs typeface="Diwan Kufi" pitchFamily="2" charset="-78"/>
+              </a:rPr>
+              <a:t>(@</a:t>
+            </a:r>
+            <a:r>
+              <a:rPr lang="en-US" altLang="ja-JP" sz="2400" b="1" dirty="0" err="1">
+                <a:gradFill>
+                  <a:gsLst>
+                    <a:gs pos="50000">
+                      <a:srgbClr val="754169"/>
+                    </a:gs>
+                    <a:gs pos="0">
+                      <a:srgbClr val="4A2544"/>
+                    </a:gs>
+                    <a:gs pos="100000">
+                      <a:srgbClr val="BA799D"/>
+                    </a:gs>
+                  </a:gsLst>
+                  <a:lin ang="0" scaled="1"/>
+                </a:gradFill>
+                <a:latin typeface="Meiryo UI" panose="020B0604030504040204" pitchFamily="34" charset="-128"/>
+                <a:ea typeface="Meiryo UI" panose="020B0604030504040204" pitchFamily="34" charset="-128"/>
+                <a:cs typeface="Diwan Kufi" pitchFamily="2" charset="-78"/>
+              </a:rPr>
+              <a:t>hiroga_cc</a:t>
+            </a:r>
+            <a:r>
+              <a:rPr lang="en-US" altLang="ja-JP" sz="2400" b="1" dirty="0">
+                <a:gradFill>
+                  <a:gsLst>
+                    <a:gs pos="50000">
+                      <a:srgbClr val="754169"/>
+                    </a:gs>
+                    <a:gs pos="0">
+                      <a:srgbClr val="4A2544"/>
+                    </a:gs>
+                    <a:gs pos="100000">
+                      <a:srgbClr val="BA799D"/>
+                    </a:gs>
+                  </a:gsLst>
+                  <a:lin ang="0" scaled="1"/>
+                </a:gradFill>
+                <a:latin typeface="Meiryo UI" panose="020B0604030504040204" pitchFamily="34" charset="-128"/>
+                <a:ea typeface="Meiryo UI" panose="020B0604030504040204" pitchFamily="34" charset="-128"/>
+                <a:cs typeface="Diwan Kufi" pitchFamily="2" charset="-78"/>
+              </a:rPr>
+              <a:t>)</a:t>
+            </a:r>
+            <a:endParaRPr lang="en-US" sz="300" dirty="0">
+              <a:latin typeface="Meiryo UI" panose="020B0604030504040204" pitchFamily="34" charset="-128"/>
+              <a:ea typeface="Meiryo UI" panose="020B0604030504040204" pitchFamily="34" charset="-128"/>
+            </a:endParaRPr>
+          </a:p>
+        </p:txBody>
+      </p:sp>
+      <p:sp>
+        <p:nvSpPr>
+          <p:cNvPr id="22" name="TextBox 21">
+            <a:extLst>
+              <a:ext uri="{FF2B5EF4-FFF2-40B4-BE49-F238E27FC236}">
+                <a16:creationId xmlns:a16="http://schemas.microsoft.com/office/drawing/2014/main" id="{7F77B26C-4D30-984B-B28F-D3A0C5E7FACC}"/>
+              </a:ext>
+            </a:extLst>
+          </p:cNvPr>
+          <p:cNvSpPr txBox="1"/>
+          <p:nvPr/>
+        </p:nvSpPr>
+        <p:spPr>
+          <a:xfrm>
+            <a:off x="348812" y="308717"/>
+            <a:ext cx="2334357" cy="1569660"/>
+          </a:xfrm>
+          <a:prstGeom prst="rect">
+            <a:avLst/>
+          </a:prstGeom>
+          <a:noFill/>
+        </p:spPr>
+        <p:txBody>
+          <a:bodyPr wrap="square" rtlCol="0">
+            <a:spAutoFit/>
+          </a:bodyPr>
+          <a:lstStyle/>
+          <a:p>
+            <a:r>
+              <a:rPr lang="ja-JP" altLang="en-US" sz="4800" b="1">
+                <a:latin typeface="Meiryo UI" panose="020B0604030504040204" pitchFamily="34" charset="-128"/>
+                <a:ea typeface="Meiryo UI" panose="020B0604030504040204" pitchFamily="34" charset="-128"/>
+              </a:rPr>
+              <a:t>お</a:t>
+            </a:r>
+            <a:endParaRPr lang="en-US" altLang="ja-JP" sz="4800" b="1" dirty="0">
+              <a:latin typeface="Meiryo UI" panose="020B0604030504040204" pitchFamily="34" charset="-128"/>
+              <a:ea typeface="Meiryo UI" panose="020B0604030504040204" pitchFamily="34" charset="-128"/>
+            </a:endParaRPr>
+          </a:p>
+          <a:p>
+            <a:r>
+              <a:rPr lang="en-US" altLang="ja-JP" sz="4800" b="1" dirty="0">
+                <a:latin typeface="Meiryo UI" panose="020B0604030504040204" pitchFamily="34" charset="-128"/>
+                <a:ea typeface="Meiryo UI" panose="020B0604030504040204" pitchFamily="34" charset="-128"/>
+              </a:rPr>
+              <a:t>25C</a:t>
+            </a:r>
+            <a:endParaRPr lang="en-US" sz="4800" b="1" dirty="0">
+              <a:latin typeface="Meiryo UI" panose="020B0604030504040204" pitchFamily="34" charset="-128"/>
+              <a:ea typeface="Meiryo UI" panose="020B0604030504040204" pitchFamily="34" charset="-128"/>
+            </a:endParaRPr>
+          </a:p>
+        </p:txBody>
+      </p:sp>
+    </p:spTree>
+    <p:extLst>
+      <p:ext uri="{BB962C8B-B14F-4D97-AF65-F5344CB8AC3E}">
+        <p14:creationId xmlns:p14="http://schemas.microsoft.com/office/powerpoint/2010/main" val="876811834"/>
+      </p:ext>
+    </p:extLst>
+  </p:cSld>
+  <p:clrMapOvr>
+    <a:masterClrMapping/>
+  </p:clrMapOvr>
+</p:sld>
+</file>
+
+<file path=ppt/slides/slide3.xml><?xml version="1.0" encoding="utf-8"?>
 <p:sld xmlns:a="http://schemas.openxmlformats.org/drawingml/2006/main" xmlns:r="http://schemas.openxmlformats.org/officeDocument/2006/relationships" xmlns:p="http://schemas.openxmlformats.org/presentationml/2006/main">
   <p:cSld>
     <p:spTree>

</xml_diff>